<commit_message>
add name to poster
</commit_message>
<xml_diff>
--- a/Poster.pptx
+++ b/Poster.pptx
@@ -237,7 +237,7 @@
           <a:p>
             <a:fld id="{5536B27D-C1ED-4C55-9062-2279210E96ED}" type="datetime1">
               <a:rPr lang="en-GB" smtClean="0"/>
-              <a:t>28/06/2023</a:t>
+              <a:t>04/07/2023</a:t>
             </a:fld>
             <a:endParaRPr lang="en-GB" dirty="0"/>
           </a:p>
@@ -417,7 +417,7 @@
             <a:fld id="{B461EAF8-BEF3-4EDD-99CF-6435314FE1C9}" type="datetime1">
               <a:rPr lang="en-GB" smtClean="0"/>
               <a:pPr/>
-              <a:t>28/06/2023</a:t>
+              <a:t>04/07/2023</a:t>
             </a:fld>
             <a:endParaRPr lang="en-GB" dirty="0"/>
           </a:p>
@@ -11921,6 +11921,45 @@
             <a:r>
               <a:rPr lang="en-GB" dirty="0"/>
               <a:t>Can be used to measure temperature of the room, of the fridge, of the addict and MORE!!</a:t>
+            </a:r>
+          </a:p>
+        </p:txBody>
+      </p:sp>
+      <p:sp>
+        <p:nvSpPr>
+          <p:cNvPr id="4" name="TextBox 3">
+            <a:extLst>
+              <a:ext uri="{FF2B5EF4-FFF2-40B4-BE49-F238E27FC236}">
+                <a16:creationId xmlns:a16="http://schemas.microsoft.com/office/drawing/2014/main" id="{8E6E0C07-BE05-B669-9284-E336CFECA799}"/>
+              </a:ext>
+            </a:extLst>
+          </p:cNvPr>
+          <p:cNvSpPr txBox="1"/>
+          <p:nvPr/>
+        </p:nvSpPr>
+        <p:spPr>
+          <a:xfrm>
+            <a:off x="10120875" y="6162261"/>
+            <a:ext cx="1672253" cy="369332"/>
+          </a:xfrm>
+          <a:prstGeom prst="rect">
+            <a:avLst/>
+          </a:prstGeom>
+          <a:noFill/>
+        </p:spPr>
+        <p:txBody>
+          <a:bodyPr wrap="none" rtlCol="0">
+            <a:spAutoFit/>
+          </a:bodyPr>
+          <a:lstStyle/>
+          <a:p>
+            <a:r>
+              <a:rPr lang="en-GB" dirty="0">
+                <a:solidFill>
+                  <a:schemeClr val="bg1"/>
+                </a:solidFill>
+              </a:rPr>
+              <a:t>Luke Tenback</a:t>
             </a:r>
           </a:p>
         </p:txBody>
@@ -12730,12 +12769,12 @@
 </file>
 
 <file path=customXml/item1.xml><?xml version="1.0" encoding="utf-8"?>
-<?mso-contentType ?>
-<FormTemplates xmlns="http://schemas.microsoft.com/sharepoint/v3/contenttype/forms">
-  <Display>DocumentLibraryForm</Display>
-  <Edit>DocumentLibraryForm</Edit>
-  <New>DocumentLibraryForm</New>
-</FormTemplates>
+<p:properties xmlns:p="http://schemas.microsoft.com/office/2006/metadata/properties" xmlns:xsi="http://www.w3.org/2001/XMLSchema-instance" xmlns:pc="http://schemas.microsoft.com/office/infopath/2007/PartnerControls">
+  <documentManagement>
+    <Status xmlns="71af3243-3dd4-4a8d-8c0d-dd76da1f02a5">Not started</Status>
+    <MediaServiceKeyPoints xmlns="71af3243-3dd4-4a8d-8c0d-dd76da1f02a5" xsi:nil="true"/>
+  </documentManagement>
+</p:properties>
 </file>
 
 <file path=customXml/item2.xml><?xml version="1.0" encoding="utf-8"?>
@@ -12960,18 +12999,20 @@
 </file>
 
 <file path=customXml/item3.xml><?xml version="1.0" encoding="utf-8"?>
-<p:properties xmlns:p="http://schemas.microsoft.com/office/2006/metadata/properties" xmlns:xsi="http://www.w3.org/2001/XMLSchema-instance" xmlns:pc="http://schemas.microsoft.com/office/infopath/2007/PartnerControls">
-  <documentManagement>
-    <Status xmlns="71af3243-3dd4-4a8d-8c0d-dd76da1f02a5">Not started</Status>
-    <MediaServiceKeyPoints xmlns="71af3243-3dd4-4a8d-8c0d-dd76da1f02a5" xsi:nil="true"/>
-  </documentManagement>
-</p:properties>
+<?mso-contentType ?>
+<FormTemplates xmlns="http://schemas.microsoft.com/sharepoint/v3/contenttype/forms">
+  <Display>DocumentLibraryForm</Display>
+  <Edit>DocumentLibraryForm</Edit>
+  <New>DocumentLibraryForm</New>
+</FormTemplates>
 </file>
 
 <file path=customXml/itemProps1.xml><?xml version="1.0" encoding="utf-8"?>
-<ds:datastoreItem xmlns:ds="http://schemas.openxmlformats.org/officeDocument/2006/customXml" ds:itemID="{3C8E00D1-8EA3-4E42-801D-0253E1EAFC21}">
+<ds:datastoreItem xmlns:ds="http://schemas.openxmlformats.org/officeDocument/2006/customXml" ds:itemID="{99919F73-B6C2-4A43-95E2-833EC48925FE}">
   <ds:schemaRefs>
-    <ds:schemaRef ds:uri="http://schemas.microsoft.com/sharepoint/v3/contenttype/forms"/>
+    <ds:schemaRef ds:uri="http://schemas.microsoft.com/office/2006/metadata/properties"/>
+    <ds:schemaRef ds:uri="http://schemas.microsoft.com/office/infopath/2007/PartnerControls"/>
+    <ds:schemaRef ds:uri="71af3243-3dd4-4a8d-8c0d-dd76da1f02a5"/>
   </ds:schemaRefs>
 </ds:datastoreItem>
 </file>
@@ -12996,11 +13037,9 @@
 </file>
 
 <file path=customXml/itemProps3.xml><?xml version="1.0" encoding="utf-8"?>
-<ds:datastoreItem xmlns:ds="http://schemas.openxmlformats.org/officeDocument/2006/customXml" ds:itemID="{99919F73-B6C2-4A43-95E2-833EC48925FE}">
+<ds:datastoreItem xmlns:ds="http://schemas.openxmlformats.org/officeDocument/2006/customXml" ds:itemID="{3C8E00D1-8EA3-4E42-801D-0253E1EAFC21}">
   <ds:schemaRefs>
-    <ds:schemaRef ds:uri="http://schemas.microsoft.com/office/2006/metadata/properties"/>
-    <ds:schemaRef ds:uri="http://schemas.microsoft.com/office/infopath/2007/PartnerControls"/>
-    <ds:schemaRef ds:uri="71af3243-3dd4-4a8d-8c0d-dd76da1f02a5"/>
+    <ds:schemaRef ds:uri="http://schemas.microsoft.com/sharepoint/v3/contenttype/forms"/>
   </ds:schemaRefs>
 </ds:datastoreItem>
 </file>
</xml_diff>